<commit_message>
Updated figures with reviewers' suggestions
</commit_message>
<xml_diff>
--- a/paper/figures/flowchart.pptx
+++ b/paper/figures/flowchart.pptx
@@ -243,7 +243,7 @@
           <a:p>
             <a:fld id="{83E1F2E6-4236-A345-B1DA-533C51C1D65E}" type="datetimeFigureOut">
               <a:rPr lang="en-US" smtClean="0"/>
-              <a:t>5/31/21</a:t>
+              <a:t>4/12/22</a:t>
             </a:fld>
             <a:endParaRPr lang="en-US"/>
           </a:p>
@@ -413,7 +413,7 @@
           <a:p>
             <a:fld id="{83E1F2E6-4236-A345-B1DA-533C51C1D65E}" type="datetimeFigureOut">
               <a:rPr lang="en-US" smtClean="0"/>
-              <a:t>5/31/21</a:t>
+              <a:t>4/12/22</a:t>
             </a:fld>
             <a:endParaRPr lang="en-US"/>
           </a:p>
@@ -593,7 +593,7 @@
           <a:p>
             <a:fld id="{83E1F2E6-4236-A345-B1DA-533C51C1D65E}" type="datetimeFigureOut">
               <a:rPr lang="en-US" smtClean="0"/>
-              <a:t>5/31/21</a:t>
+              <a:t>4/12/22</a:t>
             </a:fld>
             <a:endParaRPr lang="en-US"/>
           </a:p>
@@ -763,7 +763,7 @@
           <a:p>
             <a:fld id="{83E1F2E6-4236-A345-B1DA-533C51C1D65E}" type="datetimeFigureOut">
               <a:rPr lang="en-US" smtClean="0"/>
-              <a:t>5/31/21</a:t>
+              <a:t>4/12/22</a:t>
             </a:fld>
             <a:endParaRPr lang="en-US"/>
           </a:p>
@@ -1009,7 +1009,7 @@
           <a:p>
             <a:fld id="{83E1F2E6-4236-A345-B1DA-533C51C1D65E}" type="datetimeFigureOut">
               <a:rPr lang="en-US" smtClean="0"/>
-              <a:t>5/31/21</a:t>
+              <a:t>4/12/22</a:t>
             </a:fld>
             <a:endParaRPr lang="en-US"/>
           </a:p>
@@ -1241,7 +1241,7 @@
           <a:p>
             <a:fld id="{83E1F2E6-4236-A345-B1DA-533C51C1D65E}" type="datetimeFigureOut">
               <a:rPr lang="en-US" smtClean="0"/>
-              <a:t>5/31/21</a:t>
+              <a:t>4/12/22</a:t>
             </a:fld>
             <a:endParaRPr lang="en-US"/>
           </a:p>
@@ -1608,7 +1608,7 @@
           <a:p>
             <a:fld id="{83E1F2E6-4236-A345-B1DA-533C51C1D65E}" type="datetimeFigureOut">
               <a:rPr lang="en-US" smtClean="0"/>
-              <a:t>5/31/21</a:t>
+              <a:t>4/12/22</a:t>
             </a:fld>
             <a:endParaRPr lang="en-US"/>
           </a:p>
@@ -1726,7 +1726,7 @@
           <a:p>
             <a:fld id="{83E1F2E6-4236-A345-B1DA-533C51C1D65E}" type="datetimeFigureOut">
               <a:rPr lang="en-US" smtClean="0"/>
-              <a:t>5/31/21</a:t>
+              <a:t>4/12/22</a:t>
             </a:fld>
             <a:endParaRPr lang="en-US"/>
           </a:p>
@@ -1821,7 +1821,7 @@
           <a:p>
             <a:fld id="{83E1F2E6-4236-A345-B1DA-533C51C1D65E}" type="datetimeFigureOut">
               <a:rPr lang="en-US" smtClean="0"/>
-              <a:t>5/31/21</a:t>
+              <a:t>4/12/22</a:t>
             </a:fld>
             <a:endParaRPr lang="en-US"/>
           </a:p>
@@ -2098,7 +2098,7 @@
           <a:p>
             <a:fld id="{83E1F2E6-4236-A345-B1DA-533C51C1D65E}" type="datetimeFigureOut">
               <a:rPr lang="en-US" smtClean="0"/>
-              <a:t>5/31/21</a:t>
+              <a:t>4/12/22</a:t>
             </a:fld>
             <a:endParaRPr lang="en-US"/>
           </a:p>
@@ -2355,7 +2355,7 @@
           <a:p>
             <a:fld id="{83E1F2E6-4236-A345-B1DA-533C51C1D65E}" type="datetimeFigureOut">
               <a:rPr lang="en-US" smtClean="0"/>
-              <a:t>5/31/21</a:t>
+              <a:t>4/12/22</a:t>
             </a:fld>
             <a:endParaRPr lang="en-US"/>
           </a:p>
@@ -2568,7 +2568,7 @@
           <a:p>
             <a:fld id="{83E1F2E6-4236-A345-B1DA-533C51C1D65E}" type="datetimeFigureOut">
               <a:rPr lang="en-US" smtClean="0"/>
-              <a:t>5/31/21</a:t>
+              <a:t>4/12/22</a:t>
             </a:fld>
             <a:endParaRPr lang="en-US"/>
           </a:p>
@@ -28800,8 +28800,8 @@
           </p:txBody>
         </p:sp>
       </p:grpSp>
-      <mc:AlternateContent xmlns:mc="http://schemas.openxmlformats.org/markup-compatibility/2006">
-        <mc:Choice xmlns:a14="http://schemas.microsoft.com/office/drawing/2010/main" Requires="a14">
+      <mc:AlternateContent xmlns:mc="http://schemas.openxmlformats.org/markup-compatibility/2006" xmlns:a14="http://schemas.microsoft.com/office/drawing/2010/main">
+        <mc:Choice Requires="a14">
           <p:sp>
             <p:nvSpPr>
               <p:cNvPr id="73" name="TextBox 72">
@@ -28893,7 +28893,7 @@
             </p:txBody>
           </p:sp>
         </mc:Choice>
-        <mc:Fallback>
+        <mc:Fallback xmlns="">
           <p:sp>
             <p:nvSpPr>
               <p:cNvPr id="73" name="TextBox 72">
@@ -28938,8 +28938,8 @@
           </p:sp>
         </mc:Fallback>
       </mc:AlternateContent>
-      <mc:AlternateContent xmlns:mc="http://schemas.openxmlformats.org/markup-compatibility/2006">
-        <mc:Choice xmlns:a14="http://schemas.microsoft.com/office/drawing/2010/main" Requires="a14">
+      <mc:AlternateContent xmlns:mc="http://schemas.openxmlformats.org/markup-compatibility/2006" xmlns:a14="http://schemas.microsoft.com/office/drawing/2010/main">
+        <mc:Choice Requires="a14">
           <p:sp>
             <p:nvSpPr>
               <p:cNvPr id="74" name="TextBox 73">
@@ -29095,7 +29095,7 @@
             </p:txBody>
           </p:sp>
         </mc:Choice>
-        <mc:Fallback>
+        <mc:Fallback xmlns="">
           <p:sp>
             <p:nvSpPr>
               <p:cNvPr id="74" name="TextBox 73">
@@ -30552,8 +30552,8 @@
           </p:sp>
         </mc:Fallback>
       </mc:AlternateContent>
-      <mc:AlternateContent xmlns:mc="http://schemas.openxmlformats.org/markup-compatibility/2006">
-        <mc:Choice xmlns:a14="http://schemas.microsoft.com/office/drawing/2010/main" Requires="a14">
+      <mc:AlternateContent xmlns:mc="http://schemas.openxmlformats.org/markup-compatibility/2006" xmlns:a14="http://schemas.microsoft.com/office/drawing/2010/main">
+        <mc:Choice Requires="a14">
           <p:sp>
             <p:nvSpPr>
               <p:cNvPr id="102" name="TextBox 101">
@@ -30645,7 +30645,7 @@
             </p:txBody>
           </p:sp>
         </mc:Choice>
-        <mc:Fallback>
+        <mc:Fallback xmlns="">
           <p:sp>
             <p:nvSpPr>
               <p:cNvPr id="102" name="TextBox 101">
@@ -30690,8 +30690,8 @@
           </p:sp>
         </mc:Fallback>
       </mc:AlternateContent>
-      <mc:AlternateContent xmlns:mc="http://schemas.openxmlformats.org/markup-compatibility/2006">
-        <mc:Choice xmlns:a14="http://schemas.microsoft.com/office/drawing/2010/main" Requires="a14">
+      <mc:AlternateContent xmlns:mc="http://schemas.openxmlformats.org/markup-compatibility/2006" xmlns:a14="http://schemas.microsoft.com/office/drawing/2010/main">
+        <mc:Choice Requires="a14">
           <p:sp>
             <p:nvSpPr>
               <p:cNvPr id="103" name="TextBox 102">
@@ -30847,7 +30847,7 @@
             </p:txBody>
           </p:sp>
         </mc:Choice>
-        <mc:Fallback>
+        <mc:Fallback xmlns="">
           <p:sp>
             <p:nvSpPr>
               <p:cNvPr id="103" name="TextBox 102">
@@ -31090,8 +31090,8 @@
           </a:p>
         </p:txBody>
       </p:sp>
-      <mc:AlternateContent xmlns:mc="http://schemas.openxmlformats.org/markup-compatibility/2006">
-        <mc:Choice xmlns:a14="http://schemas.microsoft.com/office/drawing/2010/main" Requires="a14">
+      <mc:AlternateContent xmlns:mc="http://schemas.openxmlformats.org/markup-compatibility/2006" xmlns:a14="http://schemas.microsoft.com/office/drawing/2010/main">
+        <mc:Choice Requires="a14">
           <p:sp>
             <p:nvSpPr>
               <p:cNvPr id="112" name="TextBox 111">
@@ -31144,7 +31144,7 @@
             </p:txBody>
           </p:sp>
         </mc:Choice>
-        <mc:Fallback>
+        <mc:Fallback xmlns="">
           <p:sp>
             <p:nvSpPr>
               <p:cNvPr id="112" name="TextBox 111">
@@ -31189,8 +31189,8 @@
           </p:sp>
         </mc:Fallback>
       </mc:AlternateContent>
-      <mc:AlternateContent xmlns:mc="http://schemas.openxmlformats.org/markup-compatibility/2006">
-        <mc:Choice xmlns:a14="http://schemas.microsoft.com/office/drawing/2010/main" Requires="a14">
+      <mc:AlternateContent xmlns:mc="http://schemas.openxmlformats.org/markup-compatibility/2006" xmlns:a14="http://schemas.microsoft.com/office/drawing/2010/main">
+        <mc:Choice Requires="a14">
           <p:sp>
             <p:nvSpPr>
               <p:cNvPr id="113" name="TextBox 112">
@@ -31238,7 +31238,7 @@
             </p:txBody>
           </p:sp>
         </mc:Choice>
-        <mc:Fallback>
+        <mc:Fallback xmlns="">
           <p:sp>
             <p:nvSpPr>
               <p:cNvPr id="113" name="TextBox 112">
@@ -32703,8 +32703,8 @@
           </p:sp>
         </mc:Fallback>
       </mc:AlternateContent>
-      <mc:AlternateContent xmlns:mc="http://schemas.openxmlformats.org/markup-compatibility/2006">
-        <mc:Choice xmlns:a14="http://schemas.microsoft.com/office/drawing/2010/main" Requires="a14">
+      <mc:AlternateContent xmlns:mc="http://schemas.openxmlformats.org/markup-compatibility/2006" xmlns:a14="http://schemas.microsoft.com/office/drawing/2010/main">
+        <mc:Choice Requires="a14">
           <p:sp>
             <p:nvSpPr>
               <p:cNvPr id="145" name="TextBox 144">
@@ -32860,7 +32860,7 @@
             </p:txBody>
           </p:sp>
         </mc:Choice>
-        <mc:Fallback>
+        <mc:Fallback xmlns="">
           <p:sp>
             <p:nvSpPr>
               <p:cNvPr id="145" name="TextBox 144">
@@ -32905,8 +32905,8 @@
           </p:sp>
         </mc:Fallback>
       </mc:AlternateContent>
-      <mc:AlternateContent xmlns:mc="http://schemas.openxmlformats.org/markup-compatibility/2006">
-        <mc:Choice xmlns:a14="http://schemas.microsoft.com/office/drawing/2010/main" Requires="a14">
+      <mc:AlternateContent xmlns:mc="http://schemas.openxmlformats.org/markup-compatibility/2006" xmlns:a14="http://schemas.microsoft.com/office/drawing/2010/main">
+        <mc:Choice Requires="a14">
           <p:sp>
             <p:nvSpPr>
               <p:cNvPr id="147" name="TextBox 146">
@@ -32954,7 +32954,7 @@
             </p:txBody>
           </p:sp>
         </mc:Choice>
-        <mc:Fallback>
+        <mc:Fallback xmlns="">
           <p:sp>
             <p:nvSpPr>
               <p:cNvPr id="147" name="TextBox 146">
@@ -32999,8 +32999,8 @@
           </p:sp>
         </mc:Fallback>
       </mc:AlternateContent>
-      <mc:AlternateContent xmlns:mc="http://schemas.openxmlformats.org/markup-compatibility/2006">
-        <mc:Choice xmlns:a14="http://schemas.microsoft.com/office/drawing/2010/main" Requires="a14">
+      <mc:AlternateContent xmlns:mc="http://schemas.openxmlformats.org/markup-compatibility/2006" xmlns:a14="http://schemas.microsoft.com/office/drawing/2010/main">
+        <mc:Choice Requires="a14">
           <p:sp>
             <p:nvSpPr>
               <p:cNvPr id="148" name="TextBox 147">
@@ -33156,7 +33156,7 @@
             </p:txBody>
           </p:sp>
         </mc:Choice>
-        <mc:Fallback>
+        <mc:Fallback xmlns="">
           <p:sp>
             <p:nvSpPr>
               <p:cNvPr id="148" name="TextBox 147">
@@ -33680,7 +33680,7 @@
       </p:cxnSp>
       <p:pic>
         <p:nvPicPr>
-          <p:cNvPr id="128" name="Picture 127" descr="A picture containing chart&#10;&#10;Description automatically generated">
+          <p:cNvPr id="128" name="Picture 127">
             <a:extLst>
               <a:ext uri="{FF2B5EF4-FFF2-40B4-BE49-F238E27FC236}">
                 <a16:creationId xmlns:a16="http://schemas.microsoft.com/office/drawing/2014/main" id="{63DC3739-5213-774D-9210-7C36A60687D8}"/>
@@ -33694,14 +33694,13 @@
         </p:nvPicPr>
         <p:blipFill>
           <a:blip r:embed="rId40"/>
-          <a:stretch>
-            <a:fillRect/>
-          </a:stretch>
+          <a:srcRect/>
+          <a:stretch/>
         </p:blipFill>
         <p:spPr>
           <a:xfrm>
-            <a:off x="1685977" y="4239160"/>
-            <a:ext cx="4596733" cy="3772582"/>
+            <a:off x="1685977" y="4276002"/>
+            <a:ext cx="4596733" cy="3698897"/>
           </a:xfrm>
           <a:prstGeom prst="rect">
             <a:avLst/>
@@ -33710,7 +33709,7 @@
       </p:pic>
       <p:pic>
         <p:nvPicPr>
-          <p:cNvPr id="153" name="Picture 152" descr="Shape, rectangle&#10;&#10;Description automatically generated">
+          <p:cNvPr id="153" name="Picture 152">
             <a:extLst>
               <a:ext uri="{FF2B5EF4-FFF2-40B4-BE49-F238E27FC236}">
                 <a16:creationId xmlns:a16="http://schemas.microsoft.com/office/drawing/2014/main" id="{D39D127B-478F-CA48-9645-2041A79551EB}"/>
@@ -33724,14 +33723,13 @@
         </p:nvPicPr>
         <p:blipFill>
           <a:blip r:embed="rId41"/>
-          <a:stretch>
-            <a:fillRect/>
-          </a:stretch>
+          <a:srcRect/>
+          <a:stretch/>
         </p:blipFill>
         <p:spPr>
           <a:xfrm>
-            <a:off x="6737301" y="4606715"/>
-            <a:ext cx="6333366" cy="3074409"/>
+            <a:off x="6762297" y="4606715"/>
+            <a:ext cx="6283374" cy="3074409"/>
           </a:xfrm>
           <a:prstGeom prst="rect">
             <a:avLst/>
@@ -33740,7 +33738,7 @@
       </p:pic>
       <p:pic>
         <p:nvPicPr>
-          <p:cNvPr id="160" name="Picture 159" descr="Shape, rectangle&#10;&#10;Description automatically generated">
+          <p:cNvPr id="160" name="Picture 159">
             <a:extLst>
               <a:ext uri="{FF2B5EF4-FFF2-40B4-BE49-F238E27FC236}">
                 <a16:creationId xmlns:a16="http://schemas.microsoft.com/office/drawing/2014/main" id="{0D9973D5-D642-004D-9D33-C7CDEED8BD22}"/>
@@ -33754,14 +33752,13 @@
         </p:nvPicPr>
         <p:blipFill>
           <a:blip r:embed="rId42"/>
-          <a:stretch>
-            <a:fillRect/>
-          </a:stretch>
+          <a:srcRect/>
+          <a:stretch/>
         </p:blipFill>
         <p:spPr>
           <a:xfrm>
-            <a:off x="13290025" y="4606715"/>
-            <a:ext cx="6408863" cy="3074409"/>
+            <a:off x="13307917" y="4606715"/>
+            <a:ext cx="6373078" cy="3074409"/>
           </a:xfrm>
           <a:prstGeom prst="rect">
             <a:avLst/>
@@ -33799,6 +33796,45 @@
             <a:r>
               <a:rPr lang="en-US" b="1" dirty="0"/>
               <a:t>LARS: regularization path</a:t>
+            </a:r>
+          </a:p>
+        </p:txBody>
+      </p:sp>
+      <p:sp>
+        <p:nvSpPr>
+          <p:cNvPr id="154" name="TextBox 153">
+            <a:extLst>
+              <a:ext uri="{FF2B5EF4-FFF2-40B4-BE49-F238E27FC236}">
+                <a16:creationId xmlns:a16="http://schemas.microsoft.com/office/drawing/2014/main" id="{AD794936-4E5F-1348-BD0E-7EA947681125}"/>
+              </a:ext>
+            </a:extLst>
+          </p:cNvPr>
+          <p:cNvSpPr txBox="1"/>
+          <p:nvPr/>
+        </p:nvSpPr>
+        <p:spPr>
+          <a:xfrm rot="5400000">
+            <a:off x="5748236" y="5818528"/>
+            <a:ext cx="1238947" cy="338554"/>
+          </a:xfrm>
+          <a:prstGeom prst="rect">
+            <a:avLst/>
+          </a:prstGeom>
+          <a:noFill/>
+        </p:spPr>
+        <p:txBody>
+          <a:bodyPr wrap="square" rtlCol="0">
+            <a:spAutoFit/>
+          </a:bodyPr>
+          <a:lstStyle/>
+          <a:p>
+            <a:r>
+              <a:rPr lang="en-US" sz="1600" dirty="0">
+                <a:latin typeface="DEJAVU SANS" panose="020B0603030804020204" pitchFamily="34" charset="0"/>
+                <a:ea typeface="DEJAVU SANS" panose="020B0603030804020204" pitchFamily="34" charset="0"/>
+                <a:cs typeface="DEJAVU SANS" panose="020B0603030804020204" pitchFamily="34" charset="0"/>
+              </a:rPr>
+              <a:t>Amplitude</a:t>
             </a:r>
           </a:p>
         </p:txBody>

</xml_diff>